<commit_message>
Vault backup: 06/01/25 14:53 RYZEN
</commit_message>
<xml_diff>
--- a/SEW-Theorie/MQTT.pptx
+++ b/SEW-Theorie/MQTT.pptx
@@ -223,7 +223,7 @@
           <a:p>
             <a:fld id="{EEF96EEC-DAF9-4673-9EBF-DD59A418AC0B}" type="datetimeFigureOut">
               <a:rPr lang="de-AT" smtClean="0"/>
-              <a:t>02.01.2025</a:t>
+              <a:t>05.01.2025</a:t>
             </a:fld>
             <a:endParaRPr lang="de-AT"/>
           </a:p>
@@ -400,7 +400,7 @@
           <a:p>
             <a:fld id="{742B73E5-69D7-4534-828B-00C11B58432D}" type="datetimeFigureOut">
               <a:rPr lang="de-AT" smtClean="0"/>
-              <a:t>02.01.2025</a:t>
+              <a:t>05.01.2025</a:t>
             </a:fld>
             <a:endParaRPr lang="de-AT"/>
           </a:p>
@@ -1115,6 +1115,130 @@
 </p:notes>
 </file>
 
+<file path=ppt/notesSlides/notesSlide6.xml><?xml version="1.0" encoding="utf-8"?>
+<p:notes xmlns:a="http://schemas.openxmlformats.org/drawingml/2006/main" xmlns:r="http://schemas.openxmlformats.org/officeDocument/2006/relationships" xmlns:p="http://schemas.openxmlformats.org/presentationml/2006/main">
+  <p:cSld>
+    <p:spTree>
+      <p:nvGrpSpPr>
+        <p:cNvPr id="1" name=""/>
+        <p:cNvGrpSpPr/>
+        <p:nvPr/>
+      </p:nvGrpSpPr>
+      <p:grpSpPr>
+        <a:xfrm>
+          <a:off x="0" y="0"/>
+          <a:ext cx="0" cy="0"/>
+          <a:chOff x="0" y="0"/>
+          <a:chExt cx="0" cy="0"/>
+        </a:xfrm>
+      </p:grpSpPr>
+      <p:sp>
+        <p:nvSpPr>
+          <p:cNvPr id="2" name="Folienbildplatzhalter 1"/>
+          <p:cNvSpPr>
+            <a:spLocks noGrp="1" noRot="1" noChangeAspect="1"/>
+          </p:cNvSpPr>
+          <p:nvPr>
+            <p:ph type="sldImg"/>
+          </p:nvPr>
+        </p:nvSpPr>
+        <p:spPr/>
+      </p:sp>
+      <p:sp>
+        <p:nvSpPr>
+          <p:cNvPr id="3" name="Notizenplatzhalter 2"/>
+          <p:cNvSpPr>
+            <a:spLocks noGrp="1"/>
+          </p:cNvSpPr>
+          <p:nvPr>
+            <p:ph type="body" idx="1"/>
+          </p:nvPr>
+        </p:nvSpPr>
+        <p:spPr/>
+        <p:txBody>
+          <a:bodyPr/>
+          <a:lstStyle/>
+          <a:p>
+            <a:pPr marL="0" marR="0" lvl="0" indent="0" algn="l" defTabSz="914400" rtl="0" eaLnBrk="1" fontAlgn="auto" latinLnBrk="0" hangingPunct="1">
+              <a:lnSpc>
+                <a:spcPct val="100000"/>
+              </a:lnSpc>
+              <a:spcBef>
+                <a:spcPts val="0"/>
+              </a:spcBef>
+              <a:spcAft>
+                <a:spcPts val="0"/>
+              </a:spcAft>
+              <a:buClrTx/>
+              <a:buSzTx/>
+              <a:buFontTx/>
+              <a:buNone/>
+              <a:tabLst/>
+              <a:defRPr/>
+            </a:pPr>
+            <a:r>
+              <a:rPr lang="de-AT" dirty="0">
+                <a:solidFill>
+                  <a:schemeClr val="bg1"/>
+                </a:solidFill>
+              </a:rPr>
+              <a:t>.\mosquitto_sub.exe -h broker.hivemq.com -p 1883 -t 5bhitsdemo/</a:t>
+            </a:r>
+            <a:r>
+              <a:rPr lang="de-AT" dirty="0" err="1">
+                <a:solidFill>
+                  <a:schemeClr val="bg1"/>
+                </a:solidFill>
+              </a:rPr>
+              <a:t>temp</a:t>
+            </a:r>
+            <a:endParaRPr lang="de-AT" dirty="0">
+              <a:solidFill>
+                <a:schemeClr val="bg1"/>
+              </a:solidFill>
+            </a:endParaRPr>
+          </a:p>
+          <a:p>
+            <a:endParaRPr lang="de-AT" dirty="0"/>
+          </a:p>
+        </p:txBody>
+      </p:sp>
+      <p:sp>
+        <p:nvSpPr>
+          <p:cNvPr id="4" name="Foliennummernplatzhalter 3"/>
+          <p:cNvSpPr>
+            <a:spLocks noGrp="1"/>
+          </p:cNvSpPr>
+          <p:nvPr>
+            <p:ph type="sldNum" sz="quarter" idx="5"/>
+          </p:nvPr>
+        </p:nvSpPr>
+        <p:spPr/>
+        <p:txBody>
+          <a:bodyPr/>
+          <a:lstStyle/>
+          <a:p>
+            <a:fld id="{354AB613-57A8-480D-BB00-056F2090D4AB}" type="slidenum">
+              <a:rPr lang="de-AT" smtClean="0"/>
+              <a:t>7</a:t>
+            </a:fld>
+            <a:endParaRPr lang="de-AT"/>
+          </a:p>
+        </p:txBody>
+      </p:sp>
+    </p:spTree>
+    <p:extLst>
+      <p:ext uri="{BB962C8B-B14F-4D97-AF65-F5344CB8AC3E}">
+        <p14:creationId xmlns:p14="http://schemas.microsoft.com/office/powerpoint/2010/main" val="3001506708"/>
+      </p:ext>
+    </p:extLst>
+  </p:cSld>
+  <p:clrMapOvr>
+    <a:masterClrMapping/>
+  </p:clrMapOvr>
+</p:notes>
+</file>
+
 <file path=ppt/slideLayouts/slideLayout1.xml><?xml version="1.0" encoding="utf-8"?>
 <p:sldLayout xmlns:a="http://schemas.openxmlformats.org/drawingml/2006/main" xmlns:r="http://schemas.openxmlformats.org/officeDocument/2006/relationships" xmlns:p="http://schemas.openxmlformats.org/presentationml/2006/main" type="title" preserve="1">
   <p:cSld name="Titelfolie">
@@ -1264,7 +1388,7 @@
           <a:p>
             <a:fld id="{1CF8E907-BBCB-40B4-B3CF-34F68D22DA81}" type="datetimeFigureOut">
               <a:rPr lang="de-AT" smtClean="0"/>
-              <a:t>02.01.2025</a:t>
+              <a:t>05.01.2025</a:t>
             </a:fld>
             <a:endParaRPr lang="de-AT"/>
           </a:p>
@@ -1464,7 +1588,7 @@
           <a:p>
             <a:fld id="{1CF8E907-BBCB-40B4-B3CF-34F68D22DA81}" type="datetimeFigureOut">
               <a:rPr lang="de-AT" smtClean="0"/>
-              <a:t>02.01.2025</a:t>
+              <a:t>05.01.2025</a:t>
             </a:fld>
             <a:endParaRPr lang="de-AT"/>
           </a:p>
@@ -1674,7 +1798,7 @@
           <a:p>
             <a:fld id="{1CF8E907-BBCB-40B4-B3CF-34F68D22DA81}" type="datetimeFigureOut">
               <a:rPr lang="de-AT" smtClean="0"/>
-              <a:t>02.01.2025</a:t>
+              <a:t>05.01.2025</a:t>
             </a:fld>
             <a:endParaRPr lang="de-AT"/>
           </a:p>
@@ -1874,7 +1998,7 @@
           <a:p>
             <a:fld id="{1CF8E907-BBCB-40B4-B3CF-34F68D22DA81}" type="datetimeFigureOut">
               <a:rPr lang="de-AT" smtClean="0"/>
-              <a:t>02.01.2025</a:t>
+              <a:t>05.01.2025</a:t>
             </a:fld>
             <a:endParaRPr lang="de-AT"/>
           </a:p>
@@ -2150,7 +2274,7 @@
           <a:p>
             <a:fld id="{1CF8E907-BBCB-40B4-B3CF-34F68D22DA81}" type="datetimeFigureOut">
               <a:rPr lang="de-AT" smtClean="0"/>
-              <a:t>02.01.2025</a:t>
+              <a:t>05.01.2025</a:t>
             </a:fld>
             <a:endParaRPr lang="de-AT"/>
           </a:p>
@@ -2418,7 +2542,7 @@
           <a:p>
             <a:fld id="{1CF8E907-BBCB-40B4-B3CF-34F68D22DA81}" type="datetimeFigureOut">
               <a:rPr lang="de-AT" smtClean="0"/>
-              <a:t>02.01.2025</a:t>
+              <a:t>05.01.2025</a:t>
             </a:fld>
             <a:endParaRPr lang="de-AT"/>
           </a:p>
@@ -2833,7 +2957,7 @@
           <a:p>
             <a:fld id="{1CF8E907-BBCB-40B4-B3CF-34F68D22DA81}" type="datetimeFigureOut">
               <a:rPr lang="de-AT" smtClean="0"/>
-              <a:t>02.01.2025</a:t>
+              <a:t>05.01.2025</a:t>
             </a:fld>
             <a:endParaRPr lang="de-AT"/>
           </a:p>
@@ -2975,7 +3099,7 @@
           <a:p>
             <a:fld id="{1CF8E907-BBCB-40B4-B3CF-34F68D22DA81}" type="datetimeFigureOut">
               <a:rPr lang="de-AT" smtClean="0"/>
-              <a:t>02.01.2025</a:t>
+              <a:t>05.01.2025</a:t>
             </a:fld>
             <a:endParaRPr lang="de-AT"/>
           </a:p>
@@ -3088,7 +3212,7 @@
           <a:p>
             <a:fld id="{1CF8E907-BBCB-40B4-B3CF-34F68D22DA81}" type="datetimeFigureOut">
               <a:rPr lang="de-AT" smtClean="0"/>
-              <a:t>02.01.2025</a:t>
+              <a:t>05.01.2025</a:t>
             </a:fld>
             <a:endParaRPr lang="de-AT"/>
           </a:p>
@@ -3401,7 +3525,7 @@
           <a:p>
             <a:fld id="{1CF8E907-BBCB-40B4-B3CF-34F68D22DA81}" type="datetimeFigureOut">
               <a:rPr lang="de-AT" smtClean="0"/>
-              <a:t>02.01.2025</a:t>
+              <a:t>05.01.2025</a:t>
             </a:fld>
             <a:endParaRPr lang="de-AT"/>
           </a:p>
@@ -3690,7 +3814,7 @@
           <a:p>
             <a:fld id="{1CF8E907-BBCB-40B4-B3CF-34F68D22DA81}" type="datetimeFigureOut">
               <a:rPr lang="de-AT" smtClean="0"/>
-              <a:t>02.01.2025</a:t>
+              <a:t>05.01.2025</a:t>
             </a:fld>
             <a:endParaRPr lang="de-AT"/>
           </a:p>
@@ -3936,7 +4060,7 @@
           <a:p>
             <a:fld id="{1CF8E907-BBCB-40B4-B3CF-34F68D22DA81}" type="datetimeFigureOut">
               <a:rPr lang="de-AT" smtClean="0"/>
-              <a:t>02.01.2025</a:t>
+              <a:t>05.01.2025</a:t>
             </a:fld>
             <a:endParaRPr lang="de-AT"/>
           </a:p>
@@ -7357,7 +7481,7 @@
                 <a:ea typeface="Cascadia Code" panose="020B0609020000020004" pitchFamily="49" charset="0"/>
                 <a:cs typeface="Cascadia Code" panose="020B0609020000020004" pitchFamily="49" charset="0"/>
               </a:rPr>
-              <a:t>N Byte</a:t>
+              <a:t>N Bytes</a:t>
             </a:r>
             <a:endParaRPr lang="de-AT" dirty="0">
               <a:solidFill>
@@ -7827,6 +7951,53 @@
           </a:p>
         </p:txBody>
       </p:sp>
+      <p:pic>
+        <p:nvPicPr>
+          <p:cNvPr id="2052" name="Picture 4" descr="MQTT Broker - Buxbaum Automation GmbH">
+            <a:extLst>
+              <a:ext uri="{FF2B5EF4-FFF2-40B4-BE49-F238E27FC236}">
+                <a16:creationId xmlns:a16="http://schemas.microsoft.com/office/drawing/2014/main" id="{C256D772-8FE5-93BC-7748-3E08FD8E1662}"/>
+              </a:ext>
+            </a:extLst>
+          </p:cNvPr>
+          <p:cNvPicPr>
+            <a:picLocks noChangeAspect="1" noChangeArrowheads="1"/>
+          </p:cNvPicPr>
+          <p:nvPr/>
+        </p:nvPicPr>
+        <p:blipFill>
+          <a:blip r:embed="rId3">
+            <a:extLst>
+              <a:ext uri="{28A0092B-C50C-407E-A947-70E740481C1C}">
+                <a14:useLocalDpi xmlns:a14="http://schemas.microsoft.com/office/drawing/2010/main" val="0"/>
+              </a:ext>
+            </a:extLst>
+          </a:blip>
+          <a:srcRect/>
+          <a:stretch>
+            <a:fillRect/>
+          </a:stretch>
+        </p:blipFill>
+        <p:spPr bwMode="auto">
+          <a:xfrm>
+            <a:off x="9848850" y="1390650"/>
+            <a:ext cx="1828800" cy="1828800"/>
+          </a:xfrm>
+          <a:prstGeom prst="rect">
+            <a:avLst/>
+          </a:prstGeom>
+          <a:noFill/>
+          <a:extLst>
+            <a:ext uri="{909E8E84-426E-40DD-AFC4-6F175D3DCCD1}">
+              <a14:hiddenFill xmlns:a14="http://schemas.microsoft.com/office/drawing/2010/main">
+                <a:solidFill>
+                  <a:srgbClr val="FFFFFF"/>
+                </a:solidFill>
+              </a14:hiddenFill>
+            </a:ext>
+          </a:extLst>
+        </p:spPr>
+      </p:pic>
     </p:spTree>
     <p:extLst>
       <p:ext uri="{BB962C8B-B14F-4D97-AF65-F5344CB8AC3E}">
@@ -7915,22 +8086,9 @@
           <a:bodyPr/>
           <a:lstStyle/>
           <a:p>
-            <a:r>
-              <a:rPr lang="de-AT" dirty="0">
-                <a:solidFill>
-                  <a:schemeClr val="bg1"/>
-                </a:solidFill>
-              </a:rPr>
-              <a:t>.\mosquitto_sub.exe -h broker.hivemq.com -p 1883 -t 5bhitsdemo/</a:t>
-            </a:r>
-            <a:r>
-              <a:rPr lang="de-AT" dirty="0" err="1">
-                <a:solidFill>
-                  <a:schemeClr val="bg1"/>
-                </a:solidFill>
-              </a:rPr>
-              <a:t>temp</a:t>
-            </a:r>
+            <a:pPr marL="0" indent="0">
+              <a:buNone/>
+            </a:pPr>
             <a:endParaRPr lang="de-AT" dirty="0">
               <a:solidFill>
                 <a:schemeClr val="bg1"/>
@@ -7996,7 +8154,23 @@
                   <a:schemeClr val="bg1"/>
                 </a:solidFill>
               </a:rPr>
-              <a:t>QoS</a:t>
+              <a:t>QoS – Quality </a:t>
+            </a:r>
+            <a:r>
+              <a:rPr lang="de-DE" dirty="0" err="1">
+                <a:solidFill>
+                  <a:schemeClr val="bg1"/>
+                </a:solidFill>
+              </a:rPr>
+              <a:t>of</a:t>
+            </a:r>
+            <a:r>
+              <a:rPr lang="de-DE" dirty="0">
+                <a:solidFill>
+                  <a:schemeClr val="bg1"/>
+                </a:solidFill>
+              </a:rPr>
+              <a:t> Service</a:t>
             </a:r>
             <a:endParaRPr lang="de-AT" dirty="0">
               <a:solidFill>
@@ -8006,31 +8180,630 @@
           </a:p>
         </p:txBody>
       </p:sp>
-      <p:sp>
-        <p:nvSpPr>
-          <p:cNvPr id="3" name="Inhaltsplatzhalter 2">
-            <a:extLst>
-              <a:ext uri="{FF2B5EF4-FFF2-40B4-BE49-F238E27FC236}">
-                <a16:creationId xmlns:a16="http://schemas.microsoft.com/office/drawing/2014/main" id="{83F4852C-C681-3BF3-B5D5-71F7D299773D}"/>
-              </a:ext>
-            </a:extLst>
-          </p:cNvPr>
-          <p:cNvSpPr>
-            <a:spLocks noGrp="1"/>
-          </p:cNvSpPr>
+      <p:pic>
+        <p:nvPicPr>
+          <p:cNvPr id="11" name="Inhaltsplatzhalter 10">
+            <a:extLst>
+              <a:ext uri="{FF2B5EF4-FFF2-40B4-BE49-F238E27FC236}">
+                <a16:creationId xmlns:a16="http://schemas.microsoft.com/office/drawing/2014/main" id="{CF844F94-BA41-4F8E-9037-286A0675EEA8}"/>
+              </a:ext>
+            </a:extLst>
+          </p:cNvPr>
+          <p:cNvPicPr>
+            <a:picLocks noGrp="1" noChangeAspect="1"/>
+          </p:cNvPicPr>
           <p:nvPr>
             <p:ph idx="1"/>
           </p:nvPr>
-        </p:nvSpPr>
-        <p:spPr/>
-        <p:txBody>
-          <a:bodyPr/>
-          <a:lstStyle/>
-          <a:p>
-            <a:endParaRPr lang="de-AT">
+        </p:nvPicPr>
+        <p:blipFill>
+          <a:blip r:embed="rId2">
+            <a:extLst>
+              <a:ext uri="{96DAC541-7B7A-43D3-8B79-37D633B846F1}">
+                <asvg:svgBlip xmlns:asvg="http://schemas.microsoft.com/office/drawing/2016/SVG/main" r:embed="rId3"/>
+              </a:ext>
+            </a:extLst>
+          </a:blip>
+          <a:stretch>
+            <a:fillRect/>
+          </a:stretch>
+        </p:blipFill>
+        <p:spPr>
+          <a:xfrm>
+            <a:off x="838200" y="1749426"/>
+            <a:ext cx="8210550" cy="962025"/>
+          </a:xfrm>
+        </p:spPr>
+      </p:pic>
+      <p:pic>
+        <p:nvPicPr>
+          <p:cNvPr id="13" name="Grafik 12">
+            <a:extLst>
+              <a:ext uri="{FF2B5EF4-FFF2-40B4-BE49-F238E27FC236}">
+                <a16:creationId xmlns:a16="http://schemas.microsoft.com/office/drawing/2014/main" id="{2FCB87B7-49CA-BF72-C874-805D6A5075F9}"/>
+              </a:ext>
+            </a:extLst>
+          </p:cNvPr>
+          <p:cNvPicPr>
+            <a:picLocks noChangeAspect="1"/>
+          </p:cNvPicPr>
+          <p:nvPr/>
+        </p:nvPicPr>
+        <p:blipFill>
+          <a:blip r:embed="rId4">
+            <a:extLst>
+              <a:ext uri="{96DAC541-7B7A-43D3-8B79-37D633B846F1}">
+                <asvg:svgBlip xmlns:asvg="http://schemas.microsoft.com/office/drawing/2016/SVG/main" r:embed="rId5"/>
+              </a:ext>
+            </a:extLst>
+          </a:blip>
+          <a:stretch>
+            <a:fillRect/>
+          </a:stretch>
+        </p:blipFill>
+        <p:spPr>
+          <a:xfrm>
+            <a:off x="838200" y="3429000"/>
+            <a:ext cx="8201025" cy="962025"/>
+          </a:xfrm>
+          <a:prstGeom prst="rect">
+            <a:avLst/>
+          </a:prstGeom>
+        </p:spPr>
+      </p:pic>
+      <p:pic>
+        <p:nvPicPr>
+          <p:cNvPr id="15" name="Grafik 14">
+            <a:extLst>
+              <a:ext uri="{FF2B5EF4-FFF2-40B4-BE49-F238E27FC236}">
+                <a16:creationId xmlns:a16="http://schemas.microsoft.com/office/drawing/2014/main" id="{5A7953E5-A78E-4B60-5F70-283A7639B49E}"/>
+              </a:ext>
+            </a:extLst>
+          </p:cNvPr>
+          <p:cNvPicPr>
+            <a:picLocks noChangeAspect="1"/>
+          </p:cNvPicPr>
+          <p:nvPr/>
+        </p:nvPicPr>
+        <p:blipFill>
+          <a:blip r:embed="rId6">
+            <a:extLst>
+              <a:ext uri="{96DAC541-7B7A-43D3-8B79-37D633B846F1}">
+                <asvg:svgBlip xmlns:asvg="http://schemas.microsoft.com/office/drawing/2016/SVG/main" r:embed="rId7"/>
+              </a:ext>
+            </a:extLst>
+          </a:blip>
+          <a:stretch>
+            <a:fillRect/>
+          </a:stretch>
+        </p:blipFill>
+        <p:spPr>
+          <a:xfrm>
+            <a:off x="838199" y="5108574"/>
+            <a:ext cx="8201025" cy="1123950"/>
+          </a:xfrm>
+          <a:prstGeom prst="rect">
+            <a:avLst/>
+          </a:prstGeom>
+        </p:spPr>
+      </p:pic>
+      <p:sp>
+        <p:nvSpPr>
+          <p:cNvPr id="16" name="Textfeld 15">
+            <a:extLst>
+              <a:ext uri="{FF2B5EF4-FFF2-40B4-BE49-F238E27FC236}">
+                <a16:creationId xmlns:a16="http://schemas.microsoft.com/office/drawing/2014/main" id="{46263497-4CA3-D056-BC68-5BF240244EC6}"/>
+              </a:ext>
+            </a:extLst>
+          </p:cNvPr>
+          <p:cNvSpPr txBox="1"/>
+          <p:nvPr/>
+        </p:nvSpPr>
+        <p:spPr>
+          <a:xfrm>
+            <a:off x="3929061" y="1859002"/>
+            <a:ext cx="2019300" cy="369332"/>
+          </a:xfrm>
+          <a:prstGeom prst="rect">
+            <a:avLst/>
+          </a:prstGeom>
+          <a:noFill/>
+        </p:spPr>
+        <p:txBody>
+          <a:bodyPr wrap="square" rtlCol="0">
+            <a:spAutoFit/>
+          </a:bodyPr>
+          <a:lstStyle/>
+          <a:p>
+            <a:pPr algn="ctr"/>
+            <a:r>
+              <a:rPr lang="de-DE" dirty="0">
+                <a:solidFill>
+                  <a:schemeClr val="bg1"/>
+                </a:solidFill>
+                <a:latin typeface="+mj-lt"/>
+              </a:rPr>
+              <a:t>Publish QoS 0</a:t>
+            </a:r>
+            <a:endParaRPr lang="de-AT" dirty="0">
               <a:solidFill>
                 <a:schemeClr val="bg1"/>
               </a:solidFill>
+              <a:latin typeface="+mj-lt"/>
+            </a:endParaRPr>
+          </a:p>
+        </p:txBody>
+      </p:sp>
+      <p:sp>
+        <p:nvSpPr>
+          <p:cNvPr id="18" name="Textfeld 17">
+            <a:extLst>
+              <a:ext uri="{FF2B5EF4-FFF2-40B4-BE49-F238E27FC236}">
+                <a16:creationId xmlns:a16="http://schemas.microsoft.com/office/drawing/2014/main" id="{3233D8A0-5BF7-6006-E4EA-CF8581EA57F7}"/>
+              </a:ext>
+            </a:extLst>
+          </p:cNvPr>
+          <p:cNvSpPr txBox="1"/>
+          <p:nvPr/>
+        </p:nvSpPr>
+        <p:spPr>
+          <a:xfrm>
+            <a:off x="3929061" y="3244334"/>
+            <a:ext cx="2019300" cy="369332"/>
+          </a:xfrm>
+          <a:prstGeom prst="rect">
+            <a:avLst/>
+          </a:prstGeom>
+          <a:noFill/>
+        </p:spPr>
+        <p:txBody>
+          <a:bodyPr wrap="square" rtlCol="0">
+            <a:spAutoFit/>
+          </a:bodyPr>
+          <a:lstStyle/>
+          <a:p>
+            <a:pPr algn="ctr"/>
+            <a:r>
+              <a:rPr lang="de-DE" dirty="0">
+                <a:solidFill>
+                  <a:schemeClr val="bg1"/>
+                </a:solidFill>
+                <a:latin typeface="+mj-lt"/>
+              </a:rPr>
+              <a:t>Publish QoS 1</a:t>
+            </a:r>
+            <a:endParaRPr lang="de-AT" dirty="0">
+              <a:solidFill>
+                <a:schemeClr val="bg1"/>
+              </a:solidFill>
+              <a:latin typeface="+mj-lt"/>
+            </a:endParaRPr>
+          </a:p>
+        </p:txBody>
+      </p:sp>
+      <p:sp>
+        <p:nvSpPr>
+          <p:cNvPr id="19" name="Textfeld 18">
+            <a:extLst>
+              <a:ext uri="{FF2B5EF4-FFF2-40B4-BE49-F238E27FC236}">
+                <a16:creationId xmlns:a16="http://schemas.microsoft.com/office/drawing/2014/main" id="{D4E0497A-00FC-758D-2D21-3ACDAAB511E2}"/>
+              </a:ext>
+            </a:extLst>
+          </p:cNvPr>
+          <p:cNvSpPr txBox="1"/>
+          <p:nvPr/>
+        </p:nvSpPr>
+        <p:spPr>
+          <a:xfrm>
+            <a:off x="3929061" y="3798409"/>
+            <a:ext cx="2019300" cy="369332"/>
+          </a:xfrm>
+          <a:prstGeom prst="rect">
+            <a:avLst/>
+          </a:prstGeom>
+          <a:noFill/>
+        </p:spPr>
+        <p:txBody>
+          <a:bodyPr wrap="square" rtlCol="0">
+            <a:spAutoFit/>
+          </a:bodyPr>
+          <a:lstStyle/>
+          <a:p>
+            <a:pPr algn="ctr"/>
+            <a:r>
+              <a:rPr lang="de-DE" dirty="0">
+                <a:solidFill>
+                  <a:schemeClr val="bg1"/>
+                </a:solidFill>
+                <a:latin typeface="+mj-lt"/>
+              </a:rPr>
+              <a:t>PUBACK</a:t>
+            </a:r>
+            <a:endParaRPr lang="de-AT" dirty="0">
+              <a:solidFill>
+                <a:schemeClr val="bg1"/>
+              </a:solidFill>
+              <a:latin typeface="+mj-lt"/>
+            </a:endParaRPr>
+          </a:p>
+        </p:txBody>
+      </p:sp>
+      <p:sp>
+        <p:nvSpPr>
+          <p:cNvPr id="20" name="Textfeld 19">
+            <a:extLst>
+              <a:ext uri="{FF2B5EF4-FFF2-40B4-BE49-F238E27FC236}">
+                <a16:creationId xmlns:a16="http://schemas.microsoft.com/office/drawing/2014/main" id="{30169B53-4B51-CB5B-BE87-D9F9024EAC8D}"/>
+              </a:ext>
+            </a:extLst>
+          </p:cNvPr>
+          <p:cNvSpPr txBox="1"/>
+          <p:nvPr/>
+        </p:nvSpPr>
+        <p:spPr>
+          <a:xfrm>
+            <a:off x="3929061" y="4806434"/>
+            <a:ext cx="2019300" cy="369332"/>
+          </a:xfrm>
+          <a:prstGeom prst="rect">
+            <a:avLst/>
+          </a:prstGeom>
+          <a:noFill/>
+        </p:spPr>
+        <p:txBody>
+          <a:bodyPr wrap="square" rtlCol="0">
+            <a:spAutoFit/>
+          </a:bodyPr>
+          <a:lstStyle/>
+          <a:p>
+            <a:pPr algn="ctr"/>
+            <a:r>
+              <a:rPr lang="de-DE" dirty="0">
+                <a:solidFill>
+                  <a:schemeClr val="bg1"/>
+                </a:solidFill>
+                <a:latin typeface="+mj-lt"/>
+              </a:rPr>
+              <a:t>Publish QoS 2</a:t>
+            </a:r>
+            <a:endParaRPr lang="de-AT" dirty="0">
+              <a:solidFill>
+                <a:schemeClr val="bg1"/>
+              </a:solidFill>
+              <a:latin typeface="+mj-lt"/>
+            </a:endParaRPr>
+          </a:p>
+        </p:txBody>
+      </p:sp>
+      <p:sp>
+        <p:nvSpPr>
+          <p:cNvPr id="21" name="Textfeld 20">
+            <a:extLst>
+              <a:ext uri="{FF2B5EF4-FFF2-40B4-BE49-F238E27FC236}">
+                <a16:creationId xmlns:a16="http://schemas.microsoft.com/office/drawing/2014/main" id="{97ABF374-9885-5C11-E576-7F1701B54F7B}"/>
+              </a:ext>
+            </a:extLst>
+          </p:cNvPr>
+          <p:cNvSpPr txBox="1"/>
+          <p:nvPr/>
+        </p:nvSpPr>
+        <p:spPr>
+          <a:xfrm>
+            <a:off x="3929061" y="5377404"/>
+            <a:ext cx="2019300" cy="307777"/>
+          </a:xfrm>
+          <a:prstGeom prst="rect">
+            <a:avLst/>
+          </a:prstGeom>
+          <a:noFill/>
+        </p:spPr>
+        <p:txBody>
+          <a:bodyPr wrap="square" rtlCol="0">
+            <a:spAutoFit/>
+          </a:bodyPr>
+          <a:lstStyle/>
+          <a:p>
+            <a:pPr algn="ctr"/>
+            <a:r>
+              <a:rPr lang="de-DE" sz="1400" dirty="0">
+                <a:solidFill>
+                  <a:schemeClr val="bg1"/>
+                </a:solidFill>
+                <a:latin typeface="+mj-lt"/>
+              </a:rPr>
+              <a:t>PUBREC</a:t>
+            </a:r>
+            <a:endParaRPr lang="de-AT" dirty="0">
+              <a:solidFill>
+                <a:schemeClr val="bg1"/>
+              </a:solidFill>
+              <a:latin typeface="+mj-lt"/>
+            </a:endParaRPr>
+          </a:p>
+        </p:txBody>
+      </p:sp>
+      <p:sp>
+        <p:nvSpPr>
+          <p:cNvPr id="22" name="Textfeld 21">
+            <a:extLst>
+              <a:ext uri="{FF2B5EF4-FFF2-40B4-BE49-F238E27FC236}">
+                <a16:creationId xmlns:a16="http://schemas.microsoft.com/office/drawing/2014/main" id="{3D161327-5220-AA9B-54A6-2A19EC80667D}"/>
+              </a:ext>
+            </a:extLst>
+          </p:cNvPr>
+          <p:cNvSpPr txBox="1"/>
+          <p:nvPr/>
+        </p:nvSpPr>
+        <p:spPr>
+          <a:xfrm>
+            <a:off x="3929061" y="5617152"/>
+            <a:ext cx="2019300" cy="307777"/>
+          </a:xfrm>
+          <a:prstGeom prst="rect">
+            <a:avLst/>
+          </a:prstGeom>
+          <a:noFill/>
+        </p:spPr>
+        <p:txBody>
+          <a:bodyPr wrap="square" rtlCol="0">
+            <a:spAutoFit/>
+          </a:bodyPr>
+          <a:lstStyle/>
+          <a:p>
+            <a:pPr algn="ctr"/>
+            <a:r>
+              <a:rPr lang="de-DE" sz="1400" dirty="0">
+                <a:solidFill>
+                  <a:schemeClr val="bg1"/>
+                </a:solidFill>
+                <a:latin typeface="+mj-lt"/>
+              </a:rPr>
+              <a:t>PUBREL</a:t>
+            </a:r>
+            <a:endParaRPr lang="de-AT" dirty="0">
+              <a:solidFill>
+                <a:schemeClr val="bg1"/>
+              </a:solidFill>
+              <a:latin typeface="+mj-lt"/>
+            </a:endParaRPr>
+          </a:p>
+        </p:txBody>
+      </p:sp>
+      <p:sp>
+        <p:nvSpPr>
+          <p:cNvPr id="23" name="Textfeld 22">
+            <a:extLst>
+              <a:ext uri="{FF2B5EF4-FFF2-40B4-BE49-F238E27FC236}">
+                <a16:creationId xmlns:a16="http://schemas.microsoft.com/office/drawing/2014/main" id="{A0DB0348-4D70-EEA5-012B-BD2DBB524538}"/>
+              </a:ext>
+            </a:extLst>
+          </p:cNvPr>
+          <p:cNvSpPr txBox="1"/>
+          <p:nvPr/>
+        </p:nvSpPr>
+        <p:spPr>
+          <a:xfrm>
+            <a:off x="3929061" y="5856900"/>
+            <a:ext cx="2019300" cy="307777"/>
+          </a:xfrm>
+          <a:prstGeom prst="rect">
+            <a:avLst/>
+          </a:prstGeom>
+          <a:noFill/>
+        </p:spPr>
+        <p:txBody>
+          <a:bodyPr wrap="square" rtlCol="0">
+            <a:spAutoFit/>
+          </a:bodyPr>
+          <a:lstStyle/>
+          <a:p>
+            <a:pPr algn="ctr"/>
+            <a:r>
+              <a:rPr lang="de-DE" sz="1400" dirty="0">
+                <a:solidFill>
+                  <a:schemeClr val="bg1"/>
+                </a:solidFill>
+                <a:latin typeface="+mj-lt"/>
+              </a:rPr>
+              <a:t>PUBCOMP</a:t>
+            </a:r>
+            <a:endParaRPr lang="de-AT" dirty="0">
+              <a:solidFill>
+                <a:schemeClr val="bg1"/>
+              </a:solidFill>
+              <a:latin typeface="+mj-lt"/>
+            </a:endParaRPr>
+          </a:p>
+        </p:txBody>
+      </p:sp>
+      <p:sp>
+        <p:nvSpPr>
+          <p:cNvPr id="24" name="Textfeld 23">
+            <a:extLst>
+              <a:ext uri="{FF2B5EF4-FFF2-40B4-BE49-F238E27FC236}">
+                <a16:creationId xmlns:a16="http://schemas.microsoft.com/office/drawing/2014/main" id="{06112D07-BD9B-4140-A44F-6E1DCF422954}"/>
+              </a:ext>
+            </a:extLst>
+          </p:cNvPr>
+          <p:cNvSpPr txBox="1"/>
+          <p:nvPr/>
+        </p:nvSpPr>
+        <p:spPr>
+          <a:xfrm>
+            <a:off x="9258300" y="2062214"/>
+            <a:ext cx="2247900" cy="369332"/>
+          </a:xfrm>
+          <a:prstGeom prst="rect">
+            <a:avLst/>
+          </a:prstGeom>
+          <a:noFill/>
+        </p:spPr>
+        <p:txBody>
+          <a:bodyPr wrap="square" rtlCol="0">
+            <a:spAutoFit/>
+          </a:bodyPr>
+          <a:lstStyle/>
+          <a:p>
+            <a:r>
+              <a:rPr lang="de-DE" dirty="0">
+                <a:solidFill>
+                  <a:schemeClr val="bg1"/>
+                </a:solidFill>
+                <a:latin typeface="+mj-lt"/>
+              </a:rPr>
+              <a:t>At </a:t>
+            </a:r>
+            <a:r>
+              <a:rPr lang="de-DE" dirty="0" err="1">
+                <a:solidFill>
+                  <a:schemeClr val="bg1"/>
+                </a:solidFill>
+                <a:latin typeface="+mj-lt"/>
+              </a:rPr>
+              <a:t>most</a:t>
+            </a:r>
+            <a:r>
+              <a:rPr lang="de-DE" dirty="0">
+                <a:solidFill>
+                  <a:schemeClr val="bg1"/>
+                </a:solidFill>
+                <a:latin typeface="+mj-lt"/>
+              </a:rPr>
+              <a:t> </a:t>
+            </a:r>
+            <a:r>
+              <a:rPr lang="de-DE" dirty="0" err="1">
+                <a:solidFill>
+                  <a:schemeClr val="bg1"/>
+                </a:solidFill>
+                <a:latin typeface="+mj-lt"/>
+              </a:rPr>
+              <a:t>once</a:t>
+            </a:r>
+            <a:endParaRPr lang="de-DE" dirty="0">
+              <a:solidFill>
+                <a:schemeClr val="bg1"/>
+              </a:solidFill>
+              <a:latin typeface="+mj-lt"/>
+            </a:endParaRPr>
+          </a:p>
+        </p:txBody>
+      </p:sp>
+      <p:sp>
+        <p:nvSpPr>
+          <p:cNvPr id="25" name="Textfeld 24">
+            <a:extLst>
+              <a:ext uri="{FF2B5EF4-FFF2-40B4-BE49-F238E27FC236}">
+                <a16:creationId xmlns:a16="http://schemas.microsoft.com/office/drawing/2014/main" id="{A01E0347-991D-33EE-8D17-B26C204360C3}"/>
+              </a:ext>
+            </a:extLst>
+          </p:cNvPr>
+          <p:cNvSpPr txBox="1"/>
+          <p:nvPr/>
+        </p:nvSpPr>
+        <p:spPr>
+          <a:xfrm>
+            <a:off x="9258300" y="3725346"/>
+            <a:ext cx="2247900" cy="369332"/>
+          </a:xfrm>
+          <a:prstGeom prst="rect">
+            <a:avLst/>
+          </a:prstGeom>
+          <a:noFill/>
+        </p:spPr>
+        <p:txBody>
+          <a:bodyPr wrap="square" rtlCol="0">
+            <a:spAutoFit/>
+          </a:bodyPr>
+          <a:lstStyle/>
+          <a:p>
+            <a:r>
+              <a:rPr lang="de-DE" dirty="0">
+                <a:solidFill>
+                  <a:schemeClr val="bg1"/>
+                </a:solidFill>
+                <a:latin typeface="+mj-lt"/>
+              </a:rPr>
+              <a:t>At least </a:t>
+            </a:r>
+            <a:r>
+              <a:rPr lang="de-DE" dirty="0" err="1">
+                <a:solidFill>
+                  <a:schemeClr val="bg1"/>
+                </a:solidFill>
+                <a:latin typeface="+mj-lt"/>
+              </a:rPr>
+              <a:t>once</a:t>
+            </a:r>
+            <a:endParaRPr lang="de-AT" dirty="0">
+              <a:solidFill>
+                <a:schemeClr val="bg1"/>
+              </a:solidFill>
+              <a:latin typeface="+mj-lt"/>
+            </a:endParaRPr>
+          </a:p>
+        </p:txBody>
+      </p:sp>
+      <p:sp>
+        <p:nvSpPr>
+          <p:cNvPr id="26" name="Textfeld 25">
+            <a:extLst>
+              <a:ext uri="{FF2B5EF4-FFF2-40B4-BE49-F238E27FC236}">
+                <a16:creationId xmlns:a16="http://schemas.microsoft.com/office/drawing/2014/main" id="{9ACC5C60-D33B-CDDF-FA79-5BF50FDDB509}"/>
+              </a:ext>
+            </a:extLst>
+          </p:cNvPr>
+          <p:cNvSpPr txBox="1"/>
+          <p:nvPr/>
+        </p:nvSpPr>
+        <p:spPr>
+          <a:xfrm>
+            <a:off x="9258300" y="5432486"/>
+            <a:ext cx="2247900" cy="369332"/>
+          </a:xfrm>
+          <a:prstGeom prst="rect">
+            <a:avLst/>
+          </a:prstGeom>
+          <a:noFill/>
+        </p:spPr>
+        <p:txBody>
+          <a:bodyPr wrap="square" rtlCol="0">
+            <a:spAutoFit/>
+          </a:bodyPr>
+          <a:lstStyle/>
+          <a:p>
+            <a:r>
+              <a:rPr lang="de-DE" dirty="0" err="1">
+                <a:solidFill>
+                  <a:schemeClr val="bg1"/>
+                </a:solidFill>
+                <a:latin typeface="+mj-lt"/>
+              </a:rPr>
+              <a:t>Exactly</a:t>
+            </a:r>
+            <a:r>
+              <a:rPr lang="de-DE" dirty="0">
+                <a:solidFill>
+                  <a:schemeClr val="bg1"/>
+                </a:solidFill>
+                <a:latin typeface="+mj-lt"/>
+              </a:rPr>
+              <a:t> </a:t>
+            </a:r>
+            <a:r>
+              <a:rPr lang="de-DE" dirty="0" err="1">
+                <a:solidFill>
+                  <a:schemeClr val="bg1"/>
+                </a:solidFill>
+                <a:latin typeface="+mj-lt"/>
+              </a:rPr>
+              <a:t>once</a:t>
+            </a:r>
+            <a:endParaRPr lang="de-AT" dirty="0">
+              <a:solidFill>
+                <a:schemeClr val="bg1"/>
+              </a:solidFill>
+              <a:latin typeface="+mj-lt"/>
             </a:endParaRPr>
           </a:p>
         </p:txBody>
@@ -8045,6 +8818,665 @@
   <p:clrMapOvr>
     <a:masterClrMapping/>
   </p:clrMapOvr>
+  <p:timing>
+    <p:tnLst>
+      <p:par>
+        <p:cTn id="1" dur="indefinite" restart="never" nodeType="tmRoot">
+          <p:childTnLst>
+            <p:seq concurrent="1" nextAc="seek">
+              <p:cTn id="2" dur="indefinite" nodeType="mainSeq">
+                <p:childTnLst>
+                  <p:par>
+                    <p:cTn id="3" fill="hold">
+                      <p:stCondLst>
+                        <p:cond delay="indefinite"/>
+                      </p:stCondLst>
+                      <p:childTnLst>
+                        <p:par>
+                          <p:cTn id="4" fill="hold">
+                            <p:stCondLst>
+                              <p:cond delay="0"/>
+                            </p:stCondLst>
+                            <p:childTnLst>
+                              <p:par>
+                                <p:cTn id="5" presetID="10" presetClass="entr" presetSubtype="0" fill="hold" nodeType="clickEffect">
+                                  <p:stCondLst>
+                                    <p:cond delay="0"/>
+                                  </p:stCondLst>
+                                  <p:childTnLst>
+                                    <p:set>
+                                      <p:cBhvr>
+                                        <p:cTn id="6" dur="1" fill="hold">
+                                          <p:stCondLst>
+                                            <p:cond delay="0"/>
+                                          </p:stCondLst>
+                                        </p:cTn>
+                                        <p:tgtEl>
+                                          <p:spTgt spid="11"/>
+                                        </p:tgtEl>
+                                        <p:attrNameLst>
+                                          <p:attrName>style.visibility</p:attrName>
+                                        </p:attrNameLst>
+                                      </p:cBhvr>
+                                      <p:to>
+                                        <p:strVal val="visible"/>
+                                      </p:to>
+                                    </p:set>
+                                    <p:animEffect transition="in" filter="fade">
+                                      <p:cBhvr>
+                                        <p:cTn id="7" dur="500"/>
+                                        <p:tgtEl>
+                                          <p:spTgt spid="11"/>
+                                        </p:tgtEl>
+                                      </p:cBhvr>
+                                    </p:animEffect>
+                                  </p:childTnLst>
+                                </p:cTn>
+                              </p:par>
+                              <p:par>
+                                <p:cTn id="8" presetID="10" presetClass="entr" presetSubtype="0" fill="hold" grpId="0" nodeType="withEffect">
+                                  <p:stCondLst>
+                                    <p:cond delay="0"/>
+                                  </p:stCondLst>
+                                  <p:childTnLst>
+                                    <p:set>
+                                      <p:cBhvr>
+                                        <p:cTn id="9" dur="1" fill="hold">
+                                          <p:stCondLst>
+                                            <p:cond delay="0"/>
+                                          </p:stCondLst>
+                                        </p:cTn>
+                                        <p:tgtEl>
+                                          <p:spTgt spid="16"/>
+                                        </p:tgtEl>
+                                        <p:attrNameLst>
+                                          <p:attrName>style.visibility</p:attrName>
+                                        </p:attrNameLst>
+                                      </p:cBhvr>
+                                      <p:to>
+                                        <p:strVal val="visible"/>
+                                      </p:to>
+                                    </p:set>
+                                    <p:animEffect transition="in" filter="fade">
+                                      <p:cBhvr>
+                                        <p:cTn id="10" dur="500"/>
+                                        <p:tgtEl>
+                                          <p:spTgt spid="16"/>
+                                        </p:tgtEl>
+                                      </p:cBhvr>
+                                    </p:animEffect>
+                                  </p:childTnLst>
+                                </p:cTn>
+                              </p:par>
+                              <p:par>
+                                <p:cTn id="11" presetID="10" presetClass="entr" presetSubtype="0" fill="hold" grpId="0" nodeType="withEffect">
+                                  <p:stCondLst>
+                                    <p:cond delay="0"/>
+                                  </p:stCondLst>
+                                  <p:childTnLst>
+                                    <p:set>
+                                      <p:cBhvr>
+                                        <p:cTn id="12" dur="1" fill="hold">
+                                          <p:stCondLst>
+                                            <p:cond delay="0"/>
+                                          </p:stCondLst>
+                                        </p:cTn>
+                                        <p:tgtEl>
+                                          <p:spTgt spid="24"/>
+                                        </p:tgtEl>
+                                        <p:attrNameLst>
+                                          <p:attrName>style.visibility</p:attrName>
+                                        </p:attrNameLst>
+                                      </p:cBhvr>
+                                      <p:to>
+                                        <p:strVal val="visible"/>
+                                      </p:to>
+                                    </p:set>
+                                    <p:animEffect transition="in" filter="fade">
+                                      <p:cBhvr>
+                                        <p:cTn id="13" dur="500"/>
+                                        <p:tgtEl>
+                                          <p:spTgt spid="24"/>
+                                        </p:tgtEl>
+                                      </p:cBhvr>
+                                    </p:animEffect>
+                                  </p:childTnLst>
+                                </p:cTn>
+                              </p:par>
+                            </p:childTnLst>
+                          </p:cTn>
+                        </p:par>
+                      </p:childTnLst>
+                    </p:cTn>
+                  </p:par>
+                  <p:par>
+                    <p:cTn id="14" fill="hold">
+                      <p:stCondLst>
+                        <p:cond delay="indefinite"/>
+                      </p:stCondLst>
+                      <p:childTnLst>
+                        <p:par>
+                          <p:cTn id="15" fill="hold">
+                            <p:stCondLst>
+                              <p:cond delay="0"/>
+                            </p:stCondLst>
+                            <p:childTnLst>
+                              <p:par>
+                                <p:cTn id="16" presetID="10" presetClass="entr" presetSubtype="0" fill="hold" nodeType="clickEffect">
+                                  <p:stCondLst>
+                                    <p:cond delay="0"/>
+                                  </p:stCondLst>
+                                  <p:childTnLst>
+                                    <p:set>
+                                      <p:cBhvr>
+                                        <p:cTn id="17" dur="1" fill="hold">
+                                          <p:stCondLst>
+                                            <p:cond delay="0"/>
+                                          </p:stCondLst>
+                                        </p:cTn>
+                                        <p:tgtEl>
+                                          <p:spTgt spid="13"/>
+                                        </p:tgtEl>
+                                        <p:attrNameLst>
+                                          <p:attrName>style.visibility</p:attrName>
+                                        </p:attrNameLst>
+                                      </p:cBhvr>
+                                      <p:to>
+                                        <p:strVal val="visible"/>
+                                      </p:to>
+                                    </p:set>
+                                    <p:animEffect transition="in" filter="fade">
+                                      <p:cBhvr>
+                                        <p:cTn id="18" dur="500"/>
+                                        <p:tgtEl>
+                                          <p:spTgt spid="13"/>
+                                        </p:tgtEl>
+                                      </p:cBhvr>
+                                    </p:animEffect>
+                                  </p:childTnLst>
+                                </p:cTn>
+                              </p:par>
+                              <p:par>
+                                <p:cTn id="19" presetID="10" presetClass="entr" presetSubtype="0" fill="hold" grpId="0" nodeType="withEffect">
+                                  <p:stCondLst>
+                                    <p:cond delay="0"/>
+                                  </p:stCondLst>
+                                  <p:childTnLst>
+                                    <p:set>
+                                      <p:cBhvr>
+                                        <p:cTn id="20" dur="1" fill="hold">
+                                          <p:stCondLst>
+                                            <p:cond delay="0"/>
+                                          </p:stCondLst>
+                                        </p:cTn>
+                                        <p:tgtEl>
+                                          <p:spTgt spid="25"/>
+                                        </p:tgtEl>
+                                        <p:attrNameLst>
+                                          <p:attrName>style.visibility</p:attrName>
+                                        </p:attrNameLst>
+                                      </p:cBhvr>
+                                      <p:to>
+                                        <p:strVal val="visible"/>
+                                      </p:to>
+                                    </p:set>
+                                    <p:animEffect transition="in" filter="fade">
+                                      <p:cBhvr>
+                                        <p:cTn id="21" dur="500"/>
+                                        <p:tgtEl>
+                                          <p:spTgt spid="25"/>
+                                        </p:tgtEl>
+                                      </p:cBhvr>
+                                    </p:animEffect>
+                                  </p:childTnLst>
+                                </p:cTn>
+                              </p:par>
+                            </p:childTnLst>
+                          </p:cTn>
+                        </p:par>
+                      </p:childTnLst>
+                    </p:cTn>
+                  </p:par>
+                  <p:par>
+                    <p:cTn id="22" fill="hold">
+                      <p:stCondLst>
+                        <p:cond delay="indefinite"/>
+                      </p:stCondLst>
+                      <p:childTnLst>
+                        <p:par>
+                          <p:cTn id="23" fill="hold">
+                            <p:stCondLst>
+                              <p:cond delay="0"/>
+                            </p:stCondLst>
+                            <p:childTnLst>
+                              <p:par>
+                                <p:cTn id="24" presetID="10" presetClass="entr" presetSubtype="0" fill="hold" grpId="0" nodeType="clickEffect">
+                                  <p:stCondLst>
+                                    <p:cond delay="0"/>
+                                  </p:stCondLst>
+                                  <p:childTnLst>
+                                    <p:set>
+                                      <p:cBhvr>
+                                        <p:cTn id="25" dur="1" fill="hold">
+                                          <p:stCondLst>
+                                            <p:cond delay="0"/>
+                                          </p:stCondLst>
+                                        </p:cTn>
+                                        <p:tgtEl>
+                                          <p:spTgt spid="18"/>
+                                        </p:tgtEl>
+                                        <p:attrNameLst>
+                                          <p:attrName>style.visibility</p:attrName>
+                                        </p:attrNameLst>
+                                      </p:cBhvr>
+                                      <p:to>
+                                        <p:strVal val="visible"/>
+                                      </p:to>
+                                    </p:set>
+                                    <p:animEffect transition="in" filter="fade">
+                                      <p:cBhvr>
+                                        <p:cTn id="26" dur="500"/>
+                                        <p:tgtEl>
+                                          <p:spTgt spid="18"/>
+                                        </p:tgtEl>
+                                      </p:cBhvr>
+                                    </p:animEffect>
+                                  </p:childTnLst>
+                                </p:cTn>
+                              </p:par>
+                            </p:childTnLst>
+                          </p:cTn>
+                        </p:par>
+                      </p:childTnLst>
+                    </p:cTn>
+                  </p:par>
+                  <p:par>
+                    <p:cTn id="27" fill="hold">
+                      <p:stCondLst>
+                        <p:cond delay="indefinite"/>
+                      </p:stCondLst>
+                      <p:childTnLst>
+                        <p:par>
+                          <p:cTn id="28" fill="hold">
+                            <p:stCondLst>
+                              <p:cond delay="0"/>
+                            </p:stCondLst>
+                            <p:childTnLst>
+                              <p:par>
+                                <p:cTn id="29" presetID="10" presetClass="entr" presetSubtype="0" fill="hold" grpId="0" nodeType="clickEffect">
+                                  <p:stCondLst>
+                                    <p:cond delay="0"/>
+                                  </p:stCondLst>
+                                  <p:childTnLst>
+                                    <p:set>
+                                      <p:cBhvr>
+                                        <p:cTn id="30" dur="1" fill="hold">
+                                          <p:stCondLst>
+                                            <p:cond delay="0"/>
+                                          </p:stCondLst>
+                                        </p:cTn>
+                                        <p:tgtEl>
+                                          <p:spTgt spid="19"/>
+                                        </p:tgtEl>
+                                        <p:attrNameLst>
+                                          <p:attrName>style.visibility</p:attrName>
+                                        </p:attrNameLst>
+                                      </p:cBhvr>
+                                      <p:to>
+                                        <p:strVal val="visible"/>
+                                      </p:to>
+                                    </p:set>
+                                    <p:animEffect transition="in" filter="fade">
+                                      <p:cBhvr>
+                                        <p:cTn id="31" dur="500"/>
+                                        <p:tgtEl>
+                                          <p:spTgt spid="19"/>
+                                        </p:tgtEl>
+                                      </p:cBhvr>
+                                    </p:animEffect>
+                                  </p:childTnLst>
+                                </p:cTn>
+                              </p:par>
+                            </p:childTnLst>
+                          </p:cTn>
+                        </p:par>
+                      </p:childTnLst>
+                    </p:cTn>
+                  </p:par>
+                  <p:par>
+                    <p:cTn id="32" fill="hold">
+                      <p:stCondLst>
+                        <p:cond delay="indefinite"/>
+                      </p:stCondLst>
+                      <p:childTnLst>
+                        <p:par>
+                          <p:cTn id="33" fill="hold">
+                            <p:stCondLst>
+                              <p:cond delay="0"/>
+                            </p:stCondLst>
+                            <p:childTnLst>
+                              <p:par>
+                                <p:cTn id="34" presetID="10" presetClass="entr" presetSubtype="0" fill="hold" nodeType="clickEffect">
+                                  <p:stCondLst>
+                                    <p:cond delay="0"/>
+                                  </p:stCondLst>
+                                  <p:childTnLst>
+                                    <p:set>
+                                      <p:cBhvr>
+                                        <p:cTn id="35" dur="1" fill="hold">
+                                          <p:stCondLst>
+                                            <p:cond delay="0"/>
+                                          </p:stCondLst>
+                                        </p:cTn>
+                                        <p:tgtEl>
+                                          <p:spTgt spid="15"/>
+                                        </p:tgtEl>
+                                        <p:attrNameLst>
+                                          <p:attrName>style.visibility</p:attrName>
+                                        </p:attrNameLst>
+                                      </p:cBhvr>
+                                      <p:to>
+                                        <p:strVal val="visible"/>
+                                      </p:to>
+                                    </p:set>
+                                    <p:animEffect transition="in" filter="fade">
+                                      <p:cBhvr>
+                                        <p:cTn id="36" dur="500"/>
+                                        <p:tgtEl>
+                                          <p:spTgt spid="15"/>
+                                        </p:tgtEl>
+                                      </p:cBhvr>
+                                    </p:animEffect>
+                                  </p:childTnLst>
+                                </p:cTn>
+                              </p:par>
+                              <p:par>
+                                <p:cTn id="37" presetID="10" presetClass="entr" presetSubtype="0" fill="hold" grpId="0" nodeType="withEffect">
+                                  <p:stCondLst>
+                                    <p:cond delay="0"/>
+                                  </p:stCondLst>
+                                  <p:childTnLst>
+                                    <p:set>
+                                      <p:cBhvr>
+                                        <p:cTn id="38" dur="1" fill="hold">
+                                          <p:stCondLst>
+                                            <p:cond delay="0"/>
+                                          </p:stCondLst>
+                                        </p:cTn>
+                                        <p:tgtEl>
+                                          <p:spTgt spid="26"/>
+                                        </p:tgtEl>
+                                        <p:attrNameLst>
+                                          <p:attrName>style.visibility</p:attrName>
+                                        </p:attrNameLst>
+                                      </p:cBhvr>
+                                      <p:to>
+                                        <p:strVal val="visible"/>
+                                      </p:to>
+                                    </p:set>
+                                    <p:animEffect transition="in" filter="fade">
+                                      <p:cBhvr>
+                                        <p:cTn id="39" dur="500"/>
+                                        <p:tgtEl>
+                                          <p:spTgt spid="26"/>
+                                        </p:tgtEl>
+                                      </p:cBhvr>
+                                    </p:animEffect>
+                                  </p:childTnLst>
+                                </p:cTn>
+                              </p:par>
+                            </p:childTnLst>
+                          </p:cTn>
+                        </p:par>
+                      </p:childTnLst>
+                    </p:cTn>
+                  </p:par>
+                  <p:par>
+                    <p:cTn id="40" fill="hold">
+                      <p:stCondLst>
+                        <p:cond delay="indefinite"/>
+                      </p:stCondLst>
+                      <p:childTnLst>
+                        <p:par>
+                          <p:cTn id="41" fill="hold">
+                            <p:stCondLst>
+                              <p:cond delay="0"/>
+                            </p:stCondLst>
+                            <p:childTnLst>
+                              <p:par>
+                                <p:cTn id="42" presetID="10" presetClass="entr" presetSubtype="0" fill="hold" grpId="0" nodeType="clickEffect">
+                                  <p:stCondLst>
+                                    <p:cond delay="0"/>
+                                  </p:stCondLst>
+                                  <p:childTnLst>
+                                    <p:set>
+                                      <p:cBhvr>
+                                        <p:cTn id="43" dur="1" fill="hold">
+                                          <p:stCondLst>
+                                            <p:cond delay="0"/>
+                                          </p:stCondLst>
+                                        </p:cTn>
+                                        <p:tgtEl>
+                                          <p:spTgt spid="20"/>
+                                        </p:tgtEl>
+                                        <p:attrNameLst>
+                                          <p:attrName>style.visibility</p:attrName>
+                                        </p:attrNameLst>
+                                      </p:cBhvr>
+                                      <p:to>
+                                        <p:strVal val="visible"/>
+                                      </p:to>
+                                    </p:set>
+                                    <p:animEffect transition="in" filter="fade">
+                                      <p:cBhvr>
+                                        <p:cTn id="44" dur="500"/>
+                                        <p:tgtEl>
+                                          <p:spTgt spid="20"/>
+                                        </p:tgtEl>
+                                      </p:cBhvr>
+                                    </p:animEffect>
+                                  </p:childTnLst>
+                                </p:cTn>
+                              </p:par>
+                            </p:childTnLst>
+                          </p:cTn>
+                        </p:par>
+                      </p:childTnLst>
+                    </p:cTn>
+                  </p:par>
+                  <p:par>
+                    <p:cTn id="45" fill="hold">
+                      <p:stCondLst>
+                        <p:cond delay="indefinite"/>
+                      </p:stCondLst>
+                      <p:childTnLst>
+                        <p:par>
+                          <p:cTn id="46" fill="hold">
+                            <p:stCondLst>
+                              <p:cond delay="0"/>
+                            </p:stCondLst>
+                            <p:childTnLst>
+                              <p:par>
+                                <p:cTn id="47" presetID="10" presetClass="entr" presetSubtype="0" fill="hold" grpId="0" nodeType="clickEffect">
+                                  <p:stCondLst>
+                                    <p:cond delay="0"/>
+                                  </p:stCondLst>
+                                  <p:childTnLst>
+                                    <p:set>
+                                      <p:cBhvr>
+                                        <p:cTn id="48" dur="1" fill="hold">
+                                          <p:stCondLst>
+                                            <p:cond delay="0"/>
+                                          </p:stCondLst>
+                                        </p:cTn>
+                                        <p:tgtEl>
+                                          <p:spTgt spid="21"/>
+                                        </p:tgtEl>
+                                        <p:attrNameLst>
+                                          <p:attrName>style.visibility</p:attrName>
+                                        </p:attrNameLst>
+                                      </p:cBhvr>
+                                      <p:to>
+                                        <p:strVal val="visible"/>
+                                      </p:to>
+                                    </p:set>
+                                    <p:animEffect transition="in" filter="fade">
+                                      <p:cBhvr>
+                                        <p:cTn id="49" dur="500"/>
+                                        <p:tgtEl>
+                                          <p:spTgt spid="21"/>
+                                        </p:tgtEl>
+                                      </p:cBhvr>
+                                    </p:animEffect>
+                                  </p:childTnLst>
+                                </p:cTn>
+                              </p:par>
+                            </p:childTnLst>
+                          </p:cTn>
+                        </p:par>
+                      </p:childTnLst>
+                    </p:cTn>
+                  </p:par>
+                  <p:par>
+                    <p:cTn id="50" fill="hold">
+                      <p:stCondLst>
+                        <p:cond delay="indefinite"/>
+                      </p:stCondLst>
+                      <p:childTnLst>
+                        <p:par>
+                          <p:cTn id="51" fill="hold">
+                            <p:stCondLst>
+                              <p:cond delay="0"/>
+                            </p:stCondLst>
+                            <p:childTnLst>
+                              <p:par>
+                                <p:cTn id="52" presetID="10" presetClass="entr" presetSubtype="0" fill="hold" grpId="0" nodeType="clickEffect">
+                                  <p:stCondLst>
+                                    <p:cond delay="0"/>
+                                  </p:stCondLst>
+                                  <p:childTnLst>
+                                    <p:set>
+                                      <p:cBhvr>
+                                        <p:cTn id="53" dur="1" fill="hold">
+                                          <p:stCondLst>
+                                            <p:cond delay="0"/>
+                                          </p:stCondLst>
+                                        </p:cTn>
+                                        <p:tgtEl>
+                                          <p:spTgt spid="22"/>
+                                        </p:tgtEl>
+                                        <p:attrNameLst>
+                                          <p:attrName>style.visibility</p:attrName>
+                                        </p:attrNameLst>
+                                      </p:cBhvr>
+                                      <p:to>
+                                        <p:strVal val="visible"/>
+                                      </p:to>
+                                    </p:set>
+                                    <p:animEffect transition="in" filter="fade">
+                                      <p:cBhvr>
+                                        <p:cTn id="54" dur="500"/>
+                                        <p:tgtEl>
+                                          <p:spTgt spid="22"/>
+                                        </p:tgtEl>
+                                      </p:cBhvr>
+                                    </p:animEffect>
+                                  </p:childTnLst>
+                                </p:cTn>
+                              </p:par>
+                            </p:childTnLst>
+                          </p:cTn>
+                        </p:par>
+                      </p:childTnLst>
+                    </p:cTn>
+                  </p:par>
+                  <p:par>
+                    <p:cTn id="55" fill="hold">
+                      <p:stCondLst>
+                        <p:cond delay="indefinite"/>
+                      </p:stCondLst>
+                      <p:childTnLst>
+                        <p:par>
+                          <p:cTn id="56" fill="hold">
+                            <p:stCondLst>
+                              <p:cond delay="0"/>
+                            </p:stCondLst>
+                            <p:childTnLst>
+                              <p:par>
+                                <p:cTn id="57" presetID="10" presetClass="entr" presetSubtype="0" fill="hold" grpId="0" nodeType="clickEffect">
+                                  <p:stCondLst>
+                                    <p:cond delay="0"/>
+                                  </p:stCondLst>
+                                  <p:childTnLst>
+                                    <p:set>
+                                      <p:cBhvr>
+                                        <p:cTn id="58" dur="1" fill="hold">
+                                          <p:stCondLst>
+                                            <p:cond delay="0"/>
+                                          </p:stCondLst>
+                                        </p:cTn>
+                                        <p:tgtEl>
+                                          <p:spTgt spid="23"/>
+                                        </p:tgtEl>
+                                        <p:attrNameLst>
+                                          <p:attrName>style.visibility</p:attrName>
+                                        </p:attrNameLst>
+                                      </p:cBhvr>
+                                      <p:to>
+                                        <p:strVal val="visible"/>
+                                      </p:to>
+                                    </p:set>
+                                    <p:animEffect transition="in" filter="fade">
+                                      <p:cBhvr>
+                                        <p:cTn id="59" dur="500"/>
+                                        <p:tgtEl>
+                                          <p:spTgt spid="23"/>
+                                        </p:tgtEl>
+                                      </p:cBhvr>
+                                    </p:animEffect>
+                                  </p:childTnLst>
+                                </p:cTn>
+                              </p:par>
+                            </p:childTnLst>
+                          </p:cTn>
+                        </p:par>
+                      </p:childTnLst>
+                    </p:cTn>
+                  </p:par>
+                </p:childTnLst>
+              </p:cTn>
+              <p:prevCondLst>
+                <p:cond evt="onPrev" delay="0">
+                  <p:tgtEl>
+                    <p:sldTgt/>
+                  </p:tgtEl>
+                </p:cond>
+              </p:prevCondLst>
+              <p:nextCondLst>
+                <p:cond evt="onNext" delay="0">
+                  <p:tgtEl>
+                    <p:sldTgt/>
+                  </p:tgtEl>
+                </p:cond>
+              </p:nextCondLst>
+            </p:seq>
+          </p:childTnLst>
+        </p:cTn>
+      </p:par>
+    </p:tnLst>
+    <p:bldLst>
+      <p:bldP spid="16" grpId="0"/>
+      <p:bldP spid="18" grpId="0"/>
+      <p:bldP spid="19" grpId="0"/>
+      <p:bldP spid="20" grpId="0"/>
+      <p:bldP spid="21" grpId="0"/>
+      <p:bldP spid="22" grpId="0"/>
+      <p:bldP spid="23" grpId="0"/>
+      <p:bldP spid="24" grpId="0"/>
+      <p:bldP spid="25" grpId="0"/>
+      <p:bldP spid="26" grpId="0"/>
+    </p:bldLst>
+  </p:timing>
 </p:sld>
 </file>
 
@@ -8155,11 +9587,30 @@
             </a:endParaRPr>
           </a:p>
           <a:p>
+            <a:r>
+              <a:rPr lang="de-AT" dirty="0">
+                <a:solidFill>
+                  <a:schemeClr val="bg1"/>
+                </a:solidFill>
+                <a:hlinkClick r:id="rId4"/>
+              </a:rPr>
+              <a:t>https://hivemq.com/blog/mqtt-essentials-part-6-mqtt-quality-of-service-levels/</a:t>
+            </a:r>
             <a:endParaRPr lang="de-AT" dirty="0">
               <a:solidFill>
                 <a:schemeClr val="bg1"/>
               </a:solidFill>
             </a:endParaRPr>
+          </a:p>
+          <a:p>
+            <a:r>
+              <a:rPr lang="de-AT" dirty="0">
+                <a:solidFill>
+                  <a:schemeClr val="bg1"/>
+                </a:solidFill>
+              </a:rPr>
+              <a:t>https://i-flow.io/ressources/mqtt-quality-of-service-qos-anwendungsfaelle-und-beispiele/</a:t>
+            </a:r>
           </a:p>
         </p:txBody>
       </p:sp>

</xml_diff>

<commit_message>
Vault backup: 07/01/25 10:56
</commit_message>
<xml_diff>
--- a/SEW-Theorie/MQTT.pptx
+++ b/SEW-Theorie/MQTT.pptx
@@ -223,7 +223,7 @@
           <a:p>
             <a:fld id="{EEF96EEC-DAF9-4673-9EBF-DD59A418AC0B}" type="datetimeFigureOut">
               <a:rPr lang="de-AT" smtClean="0"/>
-              <a:t>05.01.2025</a:t>
+              <a:t>07.01.2025</a:t>
             </a:fld>
             <a:endParaRPr lang="de-AT"/>
           </a:p>
@@ -400,7 +400,7 @@
           <a:p>
             <a:fld id="{742B73E5-69D7-4534-828B-00C11B58432D}" type="datetimeFigureOut">
               <a:rPr lang="de-AT" smtClean="0"/>
-              <a:t>05.01.2025</a:t>
+              <a:t>07.01.2025</a:t>
             </a:fld>
             <a:endParaRPr lang="de-AT"/>
           </a:p>
@@ -1388,7 +1388,7 @@
           <a:p>
             <a:fld id="{1CF8E907-BBCB-40B4-B3CF-34F68D22DA81}" type="datetimeFigureOut">
               <a:rPr lang="de-AT" smtClean="0"/>
-              <a:t>05.01.2025</a:t>
+              <a:t>07.01.2025</a:t>
             </a:fld>
             <a:endParaRPr lang="de-AT"/>
           </a:p>
@@ -1588,7 +1588,7 @@
           <a:p>
             <a:fld id="{1CF8E907-BBCB-40B4-B3CF-34F68D22DA81}" type="datetimeFigureOut">
               <a:rPr lang="de-AT" smtClean="0"/>
-              <a:t>05.01.2025</a:t>
+              <a:t>07.01.2025</a:t>
             </a:fld>
             <a:endParaRPr lang="de-AT"/>
           </a:p>
@@ -1798,7 +1798,7 @@
           <a:p>
             <a:fld id="{1CF8E907-BBCB-40B4-B3CF-34F68D22DA81}" type="datetimeFigureOut">
               <a:rPr lang="de-AT" smtClean="0"/>
-              <a:t>05.01.2025</a:t>
+              <a:t>07.01.2025</a:t>
             </a:fld>
             <a:endParaRPr lang="de-AT"/>
           </a:p>
@@ -1998,7 +1998,7 @@
           <a:p>
             <a:fld id="{1CF8E907-BBCB-40B4-B3CF-34F68D22DA81}" type="datetimeFigureOut">
               <a:rPr lang="de-AT" smtClean="0"/>
-              <a:t>05.01.2025</a:t>
+              <a:t>07.01.2025</a:t>
             </a:fld>
             <a:endParaRPr lang="de-AT"/>
           </a:p>
@@ -2274,7 +2274,7 @@
           <a:p>
             <a:fld id="{1CF8E907-BBCB-40B4-B3CF-34F68D22DA81}" type="datetimeFigureOut">
               <a:rPr lang="de-AT" smtClean="0"/>
-              <a:t>05.01.2025</a:t>
+              <a:t>07.01.2025</a:t>
             </a:fld>
             <a:endParaRPr lang="de-AT"/>
           </a:p>
@@ -2542,7 +2542,7 @@
           <a:p>
             <a:fld id="{1CF8E907-BBCB-40B4-B3CF-34F68D22DA81}" type="datetimeFigureOut">
               <a:rPr lang="de-AT" smtClean="0"/>
-              <a:t>05.01.2025</a:t>
+              <a:t>07.01.2025</a:t>
             </a:fld>
             <a:endParaRPr lang="de-AT"/>
           </a:p>
@@ -2957,7 +2957,7 @@
           <a:p>
             <a:fld id="{1CF8E907-BBCB-40B4-B3CF-34F68D22DA81}" type="datetimeFigureOut">
               <a:rPr lang="de-AT" smtClean="0"/>
-              <a:t>05.01.2025</a:t>
+              <a:t>07.01.2025</a:t>
             </a:fld>
             <a:endParaRPr lang="de-AT"/>
           </a:p>
@@ -3099,7 +3099,7 @@
           <a:p>
             <a:fld id="{1CF8E907-BBCB-40B4-B3CF-34F68D22DA81}" type="datetimeFigureOut">
               <a:rPr lang="de-AT" smtClean="0"/>
-              <a:t>05.01.2025</a:t>
+              <a:t>07.01.2025</a:t>
             </a:fld>
             <a:endParaRPr lang="de-AT"/>
           </a:p>
@@ -3212,7 +3212,7 @@
           <a:p>
             <a:fld id="{1CF8E907-BBCB-40B4-B3CF-34F68D22DA81}" type="datetimeFigureOut">
               <a:rPr lang="de-AT" smtClean="0"/>
-              <a:t>05.01.2025</a:t>
+              <a:t>07.01.2025</a:t>
             </a:fld>
             <a:endParaRPr lang="de-AT"/>
           </a:p>
@@ -3525,7 +3525,7 @@
           <a:p>
             <a:fld id="{1CF8E907-BBCB-40B4-B3CF-34F68D22DA81}" type="datetimeFigureOut">
               <a:rPr lang="de-AT" smtClean="0"/>
-              <a:t>05.01.2025</a:t>
+              <a:t>07.01.2025</a:t>
             </a:fld>
             <a:endParaRPr lang="de-AT"/>
           </a:p>
@@ -3814,7 +3814,7 @@
           <a:p>
             <a:fld id="{1CF8E907-BBCB-40B4-B3CF-34F68D22DA81}" type="datetimeFigureOut">
               <a:rPr lang="de-AT" smtClean="0"/>
-              <a:t>05.01.2025</a:t>
+              <a:t>07.01.2025</a:t>
             </a:fld>
             <a:endParaRPr lang="de-AT"/>
           </a:p>
@@ -4060,7 +4060,7 @@
           <a:p>
             <a:fld id="{1CF8E907-BBCB-40B4-B3CF-34F68D22DA81}" type="datetimeFigureOut">
               <a:rPr lang="de-AT" smtClean="0"/>
-              <a:t>05.01.2025</a:t>
+              <a:t>07.01.2025</a:t>
             </a:fld>
             <a:endParaRPr lang="de-AT"/>
           </a:p>
@@ -8083,17 +8083,19 @@
         </p:nvSpPr>
         <p:spPr/>
         <p:txBody>
-          <a:bodyPr/>
-          <a:lstStyle/>
-          <a:p>
-            <a:pPr marL="0" indent="0">
-              <a:buNone/>
-            </a:pPr>
-            <a:endParaRPr lang="de-AT" dirty="0">
-              <a:solidFill>
-                <a:schemeClr val="bg1"/>
-              </a:solidFill>
-            </a:endParaRPr>
+          <a:bodyPr>
+            <a:normAutofit/>
+          </a:bodyPr>
+          <a:lstStyle/>
+          <a:p>
+            <a:r>
+              <a:rPr lang="de-AT" dirty="0">
+                <a:solidFill>
+                  <a:schemeClr val="bg1"/>
+                </a:solidFill>
+              </a:rPr>
+              <a:t> </a:t>
+            </a:r>
           </a:p>
         </p:txBody>
       </p:sp>
@@ -9608,9 +9610,15 @@
                 <a:solidFill>
                   <a:schemeClr val="bg1"/>
                 </a:solidFill>
+                <a:hlinkClick r:id="rId5"/>
               </a:rPr>
               <a:t>https://i-flow.io/ressources/mqtt-quality-of-service-qos-anwendungsfaelle-und-beispiele/</a:t>
             </a:r>
+            <a:endParaRPr lang="de-AT" dirty="0">
+              <a:solidFill>
+                <a:schemeClr val="bg1"/>
+              </a:solidFill>
+            </a:endParaRPr>
           </a:p>
         </p:txBody>
       </p:sp>

</xml_diff>